<commit_message>
9. ve 10. Adım Tamamlandı(Local Clone ve amend)
</commit_message>
<xml_diff>
--- a/DevOps Proje Sunusu.pptx
+++ b/DevOps Proje Sunusu.pptx
@@ -42,6 +42,8 @@
     <p:sldId id="290" r:id="rId36"/>
     <p:sldId id="291" r:id="rId37"/>
     <p:sldId id="292" r:id="rId38"/>
+    <p:sldId id="293" r:id="rId39"/>
+    <p:sldId id="294" r:id="rId40"/>
   </p:sldIdLst>
   <p:sldSz cx="12192000" cy="6858000"/>
   <p:notesSz cx="6858000" cy="9144000"/>
@@ -295,7 +297,7 @@
           <a:p>
             <a:fld id="{DBDEE6A1-7115-4181-8644-D9EB52B994FD}" type="datetimeFigureOut">
               <a:rPr lang="tr-TR" smtClean="0"/>
-              <a:t>10.03.2024</a:t>
+              <a:t>12.03.2024</a:t>
             </a:fld>
             <a:endParaRPr lang="tr-TR"/>
           </a:p>
@@ -493,7 +495,7 @@
           <a:p>
             <a:fld id="{DBDEE6A1-7115-4181-8644-D9EB52B994FD}" type="datetimeFigureOut">
               <a:rPr lang="tr-TR" smtClean="0"/>
-              <a:t>10.03.2024</a:t>
+              <a:t>12.03.2024</a:t>
             </a:fld>
             <a:endParaRPr lang="tr-TR"/>
           </a:p>
@@ -701,7 +703,7 @@
           <a:p>
             <a:fld id="{DBDEE6A1-7115-4181-8644-D9EB52B994FD}" type="datetimeFigureOut">
               <a:rPr lang="tr-TR" smtClean="0"/>
-              <a:t>10.03.2024</a:t>
+              <a:t>12.03.2024</a:t>
             </a:fld>
             <a:endParaRPr lang="tr-TR"/>
           </a:p>
@@ -899,7 +901,7 @@
           <a:p>
             <a:fld id="{DBDEE6A1-7115-4181-8644-D9EB52B994FD}" type="datetimeFigureOut">
               <a:rPr lang="tr-TR" smtClean="0"/>
-              <a:t>10.03.2024</a:t>
+              <a:t>12.03.2024</a:t>
             </a:fld>
             <a:endParaRPr lang="tr-TR"/>
           </a:p>
@@ -1174,7 +1176,7 @@
           <a:p>
             <a:fld id="{DBDEE6A1-7115-4181-8644-D9EB52B994FD}" type="datetimeFigureOut">
               <a:rPr lang="tr-TR" smtClean="0"/>
-              <a:t>10.03.2024</a:t>
+              <a:t>12.03.2024</a:t>
             </a:fld>
             <a:endParaRPr lang="tr-TR"/>
           </a:p>
@@ -1439,7 +1441,7 @@
           <a:p>
             <a:fld id="{DBDEE6A1-7115-4181-8644-D9EB52B994FD}" type="datetimeFigureOut">
               <a:rPr lang="tr-TR" smtClean="0"/>
-              <a:t>10.03.2024</a:t>
+              <a:t>12.03.2024</a:t>
             </a:fld>
             <a:endParaRPr lang="tr-TR"/>
           </a:p>
@@ -1851,7 +1853,7 @@
           <a:p>
             <a:fld id="{DBDEE6A1-7115-4181-8644-D9EB52B994FD}" type="datetimeFigureOut">
               <a:rPr lang="tr-TR" smtClean="0"/>
-              <a:t>10.03.2024</a:t>
+              <a:t>12.03.2024</a:t>
             </a:fld>
             <a:endParaRPr lang="tr-TR"/>
           </a:p>
@@ -1992,7 +1994,7 @@
           <a:p>
             <a:fld id="{DBDEE6A1-7115-4181-8644-D9EB52B994FD}" type="datetimeFigureOut">
               <a:rPr lang="tr-TR" smtClean="0"/>
-              <a:t>10.03.2024</a:t>
+              <a:t>12.03.2024</a:t>
             </a:fld>
             <a:endParaRPr lang="tr-TR"/>
           </a:p>
@@ -2105,7 +2107,7 @@
           <a:p>
             <a:fld id="{DBDEE6A1-7115-4181-8644-D9EB52B994FD}" type="datetimeFigureOut">
               <a:rPr lang="tr-TR" smtClean="0"/>
-              <a:t>10.03.2024</a:t>
+              <a:t>12.03.2024</a:t>
             </a:fld>
             <a:endParaRPr lang="tr-TR"/>
           </a:p>
@@ -2416,7 +2418,7 @@
           <a:p>
             <a:fld id="{DBDEE6A1-7115-4181-8644-D9EB52B994FD}" type="datetimeFigureOut">
               <a:rPr lang="tr-TR" smtClean="0"/>
-              <a:t>10.03.2024</a:t>
+              <a:t>12.03.2024</a:t>
             </a:fld>
             <a:endParaRPr lang="tr-TR"/>
           </a:p>
@@ -2704,7 +2706,7 @@
           <a:p>
             <a:fld id="{DBDEE6A1-7115-4181-8644-D9EB52B994FD}" type="datetimeFigureOut">
               <a:rPr lang="tr-TR" smtClean="0"/>
-              <a:t>10.03.2024</a:t>
+              <a:t>12.03.2024</a:t>
             </a:fld>
             <a:endParaRPr lang="tr-TR"/>
           </a:p>
@@ -2945,7 +2947,7 @@
           <a:p>
             <a:fld id="{DBDEE6A1-7115-4181-8644-D9EB52B994FD}" type="datetimeFigureOut">
               <a:rPr lang="tr-TR" smtClean="0"/>
-              <a:t>10.03.2024</a:t>
+              <a:t>12.03.2024</a:t>
             </a:fld>
             <a:endParaRPr lang="tr-TR"/>
           </a:p>
@@ -5862,6 +5864,230 @@
     <p:extLst>
       <p:ext uri="{BB962C8B-B14F-4D97-AF65-F5344CB8AC3E}">
         <p14:creationId xmlns:p14="http://schemas.microsoft.com/office/powerpoint/2010/main" val="4293313052"/>
+      </p:ext>
+    </p:extLst>
+  </p:cSld>
+  <p:clrMapOvr>
+    <a:masterClrMapping/>
+  </p:clrMapOvr>
+</p:sld>
+</file>
+
+<file path=ppt/slides/slide38.xml><?xml version="1.0" encoding="utf-8"?>
+<p:sld xmlns:a="http://schemas.openxmlformats.org/drawingml/2006/main" xmlns:r="http://schemas.openxmlformats.org/officeDocument/2006/relationships" xmlns:p="http://schemas.openxmlformats.org/presentationml/2006/main">
+  <p:cSld>
+    <p:spTree>
+      <p:nvGrpSpPr>
+        <p:cNvPr id="1" name=""/>
+        <p:cNvGrpSpPr/>
+        <p:nvPr/>
+      </p:nvGrpSpPr>
+      <p:grpSpPr>
+        <a:xfrm>
+          <a:off x="0" y="0"/>
+          <a:ext cx="0" cy="0"/>
+          <a:chOff x="0" y="0"/>
+          <a:chExt cx="0" cy="0"/>
+        </a:xfrm>
+      </p:grpSpPr>
+      <p:pic>
+        <p:nvPicPr>
+          <p:cNvPr id="3" name="Resim 2">
+            <a:extLst>
+              <a:ext uri="{FF2B5EF4-FFF2-40B4-BE49-F238E27FC236}">
+                <a16:creationId xmlns:a16="http://schemas.microsoft.com/office/drawing/2014/main" id="{EC737D35-4C5B-4401-8E11-D98F0FEB0D3C}"/>
+              </a:ext>
+            </a:extLst>
+          </p:cNvPr>
+          <p:cNvPicPr>
+            <a:picLocks noChangeAspect="1"/>
+          </p:cNvPicPr>
+          <p:nvPr/>
+        </p:nvPicPr>
+        <p:blipFill>
+          <a:blip r:embed="rId2">
+            <a:extLst>
+              <a:ext uri="{28A0092B-C50C-407E-A947-70E740481C1C}">
+                <a14:useLocalDpi xmlns:a14="http://schemas.microsoft.com/office/drawing/2010/main" val="0"/>
+              </a:ext>
+            </a:extLst>
+          </a:blip>
+          <a:stretch>
+            <a:fillRect/>
+          </a:stretch>
+        </p:blipFill>
+        <p:spPr>
+          <a:xfrm>
+            <a:off x="3980597" y="1269242"/>
+            <a:ext cx="4230806" cy="5588758"/>
+          </a:xfrm>
+          <a:prstGeom prst="rect">
+            <a:avLst/>
+          </a:prstGeom>
+        </p:spPr>
+      </p:pic>
+      <p:sp>
+        <p:nvSpPr>
+          <p:cNvPr id="2" name="Başlık 1">
+            <a:extLst>
+              <a:ext uri="{FF2B5EF4-FFF2-40B4-BE49-F238E27FC236}">
+                <a16:creationId xmlns:a16="http://schemas.microsoft.com/office/drawing/2014/main" id="{A5D3091A-B0DF-4B7B-9F68-586CBF418A37}"/>
+              </a:ext>
+            </a:extLst>
+          </p:cNvPr>
+          <p:cNvSpPr>
+            <a:spLocks noGrp="1"/>
+          </p:cNvSpPr>
+          <p:nvPr>
+            <p:ph type="title"/>
+          </p:nvPr>
+        </p:nvSpPr>
+        <p:spPr>
+          <a:xfrm>
+            <a:off x="838200" y="0"/>
+            <a:ext cx="10515600" cy="1294903"/>
+          </a:xfrm>
+        </p:spPr>
+        <p:txBody>
+          <a:bodyPr/>
+          <a:lstStyle/>
+          <a:p>
+            <a:pPr algn="ctr"/>
+            <a:r>
+              <a:rPr lang="tr-TR" dirty="0" err="1"/>
+              <a:t>Github</a:t>
+            </a:r>
+            <a:r>
+              <a:rPr lang="tr-TR" dirty="0"/>
+              <a:t> </a:t>
+            </a:r>
+            <a:r>
+              <a:rPr lang="tr-TR" dirty="0" err="1"/>
+              <a:t>Repository</a:t>
+            </a:r>
+            <a:r>
+              <a:rPr lang="tr-TR" dirty="0"/>
+              <a:t> İlk </a:t>
+            </a:r>
+            <a:r>
+              <a:rPr lang="tr-TR" dirty="0" err="1"/>
+              <a:t>Commit</a:t>
+            </a:r>
+            <a:endParaRPr lang="tr-TR" dirty="0"/>
+          </a:p>
+        </p:txBody>
+      </p:sp>
+    </p:spTree>
+    <p:extLst>
+      <p:ext uri="{BB962C8B-B14F-4D97-AF65-F5344CB8AC3E}">
+        <p14:creationId xmlns:p14="http://schemas.microsoft.com/office/powerpoint/2010/main" val="2380704953"/>
+      </p:ext>
+    </p:extLst>
+  </p:cSld>
+  <p:clrMapOvr>
+    <a:masterClrMapping/>
+  </p:clrMapOvr>
+</p:sld>
+</file>
+
+<file path=ppt/slides/slide39.xml><?xml version="1.0" encoding="utf-8"?>
+<p:sld xmlns:a="http://schemas.openxmlformats.org/drawingml/2006/main" xmlns:r="http://schemas.openxmlformats.org/officeDocument/2006/relationships" xmlns:p="http://schemas.openxmlformats.org/presentationml/2006/main">
+  <p:cSld>
+    <p:spTree>
+      <p:nvGrpSpPr>
+        <p:cNvPr id="1" name=""/>
+        <p:cNvGrpSpPr/>
+        <p:nvPr/>
+      </p:nvGrpSpPr>
+      <p:grpSpPr>
+        <a:xfrm>
+          <a:off x="0" y="0"/>
+          <a:ext cx="0" cy="0"/>
+          <a:chOff x="0" y="0"/>
+          <a:chExt cx="0" cy="0"/>
+        </a:xfrm>
+      </p:grpSpPr>
+      <p:pic>
+        <p:nvPicPr>
+          <p:cNvPr id="3" name="Resim 2">
+            <a:extLst>
+              <a:ext uri="{FF2B5EF4-FFF2-40B4-BE49-F238E27FC236}">
+                <a16:creationId xmlns:a16="http://schemas.microsoft.com/office/drawing/2014/main" id="{729D0F90-F477-471E-838C-76AC5F640EFF}"/>
+              </a:ext>
+            </a:extLst>
+          </p:cNvPr>
+          <p:cNvPicPr>
+            <a:picLocks noChangeAspect="1"/>
+          </p:cNvPicPr>
+          <p:nvPr/>
+        </p:nvPicPr>
+        <p:blipFill>
+          <a:blip r:embed="rId2">
+            <a:extLst>
+              <a:ext uri="{28A0092B-C50C-407E-A947-70E740481C1C}">
+                <a14:useLocalDpi xmlns:a14="http://schemas.microsoft.com/office/drawing/2010/main" val="0"/>
+              </a:ext>
+            </a:extLst>
+          </a:blip>
+          <a:stretch>
+            <a:fillRect/>
+          </a:stretch>
+        </p:blipFill>
+        <p:spPr>
+          <a:xfrm>
+            <a:off x="3324225" y="2092728"/>
+            <a:ext cx="5543550" cy="4010025"/>
+          </a:xfrm>
+          <a:prstGeom prst="rect">
+            <a:avLst/>
+          </a:prstGeom>
+        </p:spPr>
+      </p:pic>
+      <p:sp>
+        <p:nvSpPr>
+          <p:cNvPr id="4" name="Başlık 3">
+            <a:extLst>
+              <a:ext uri="{FF2B5EF4-FFF2-40B4-BE49-F238E27FC236}">
+                <a16:creationId xmlns:a16="http://schemas.microsoft.com/office/drawing/2014/main" id="{821357DE-F3A5-48A9-93F7-FB22A0CAF639}"/>
+              </a:ext>
+            </a:extLst>
+          </p:cNvPr>
+          <p:cNvSpPr>
+            <a:spLocks noGrp="1"/>
+          </p:cNvSpPr>
+          <p:nvPr>
+            <p:ph type="title"/>
+          </p:nvPr>
+        </p:nvSpPr>
+        <p:spPr/>
+        <p:txBody>
+          <a:bodyPr/>
+          <a:lstStyle/>
+          <a:p>
+            <a:pPr algn="ctr"/>
+            <a:r>
+              <a:rPr lang="tr-TR" dirty="0" err="1"/>
+              <a:t>Local</a:t>
+            </a:r>
+            <a:r>
+              <a:rPr lang="tr-TR" dirty="0"/>
+              <a:t> </a:t>
+            </a:r>
+            <a:r>
+              <a:rPr lang="tr-TR" dirty="0" err="1"/>
+              <a:t>Clone</a:t>
+            </a:r>
+            <a:r>
+              <a:rPr lang="tr-TR" dirty="0"/>
+              <a:t> Alma</a:t>
+            </a:r>
+          </a:p>
+        </p:txBody>
+      </p:sp>
+    </p:spTree>
+    <p:extLst>
+      <p:ext uri="{BB962C8B-B14F-4D97-AF65-F5344CB8AC3E}">
+        <p14:creationId xmlns:p14="http://schemas.microsoft.com/office/powerpoint/2010/main" val="1362913772"/>
       </p:ext>
     </p:extLst>
   </p:cSld>

</xml_diff>

<commit_message>
git log ve git status Sunuma Eklendi
</commit_message>
<xml_diff>
--- a/DevOps Proje Sunusu.pptx
+++ b/DevOps Proje Sunusu.pptx
@@ -45,6 +45,8 @@
     <p:sldId id="293" r:id="rId39"/>
     <p:sldId id="294" r:id="rId40"/>
     <p:sldId id="295" r:id="rId41"/>
+    <p:sldId id="296" r:id="rId42"/>
+    <p:sldId id="297" r:id="rId43"/>
   </p:sldIdLst>
   <p:sldSz cx="12192000" cy="6858000"/>
   <p:notesSz cx="6858000" cy="9144000"/>
@@ -6290,6 +6292,264 @@
     <p:extLst>
       <p:ext uri="{BB962C8B-B14F-4D97-AF65-F5344CB8AC3E}">
         <p14:creationId xmlns:p14="http://schemas.microsoft.com/office/powerpoint/2010/main" val="1573291295"/>
+      </p:ext>
+    </p:extLst>
+  </p:cSld>
+  <p:clrMapOvr>
+    <a:masterClrMapping/>
+  </p:clrMapOvr>
+</p:sld>
+</file>
+
+<file path=ppt/slides/slide41.xml><?xml version="1.0" encoding="utf-8"?>
+<p:sld xmlns:a="http://schemas.openxmlformats.org/drawingml/2006/main" xmlns:r="http://schemas.openxmlformats.org/officeDocument/2006/relationships" xmlns:p="http://schemas.openxmlformats.org/presentationml/2006/main">
+  <p:cSld>
+    <p:spTree>
+      <p:nvGrpSpPr>
+        <p:cNvPr id="1" name=""/>
+        <p:cNvGrpSpPr/>
+        <p:nvPr/>
+      </p:nvGrpSpPr>
+      <p:grpSpPr>
+        <a:xfrm>
+          <a:off x="0" y="0"/>
+          <a:ext cx="0" cy="0"/>
+          <a:chOff x="0" y="0"/>
+          <a:chExt cx="0" cy="0"/>
+        </a:xfrm>
+      </p:grpSpPr>
+      <p:sp>
+        <p:nvSpPr>
+          <p:cNvPr id="2" name="Başlık 1">
+            <a:extLst>
+              <a:ext uri="{FF2B5EF4-FFF2-40B4-BE49-F238E27FC236}">
+                <a16:creationId xmlns:a16="http://schemas.microsoft.com/office/drawing/2014/main" id="{DD9A9026-7479-4996-B898-125C7ABB941A}"/>
+              </a:ext>
+            </a:extLst>
+          </p:cNvPr>
+          <p:cNvSpPr>
+            <a:spLocks noGrp="1"/>
+          </p:cNvSpPr>
+          <p:nvPr>
+            <p:ph type="title"/>
+          </p:nvPr>
+        </p:nvSpPr>
+        <p:spPr/>
+        <p:txBody>
+          <a:bodyPr/>
+          <a:lstStyle/>
+          <a:p>
+            <a:pPr algn="ctr"/>
+            <a:r>
+              <a:rPr lang="tr-TR" dirty="0"/>
+              <a:t>«git </a:t>
+            </a:r>
+            <a:r>
+              <a:rPr lang="tr-TR" dirty="0" err="1"/>
+              <a:t>log</a:t>
+            </a:r>
+            <a:r>
+              <a:rPr lang="tr-TR" dirty="0"/>
+              <a:t>» Komutu</a:t>
+            </a:r>
+          </a:p>
+        </p:txBody>
+      </p:sp>
+      <p:sp>
+        <p:nvSpPr>
+          <p:cNvPr id="3" name="İçerik Yer Tutucusu 2">
+            <a:extLst>
+              <a:ext uri="{FF2B5EF4-FFF2-40B4-BE49-F238E27FC236}">
+                <a16:creationId xmlns:a16="http://schemas.microsoft.com/office/drawing/2014/main" id="{68A75DB1-0BD0-4A7C-9A6C-1F1189ED9B4F}"/>
+              </a:ext>
+            </a:extLst>
+          </p:cNvPr>
+          <p:cNvSpPr>
+            <a:spLocks noGrp="1"/>
+          </p:cNvSpPr>
+          <p:nvPr>
+            <p:ph idx="1"/>
+          </p:nvPr>
+        </p:nvSpPr>
+        <p:spPr/>
+        <p:txBody>
+          <a:bodyPr>
+            <a:normAutofit/>
+          </a:bodyPr>
+          <a:lstStyle/>
+          <a:p>
+            <a:r>
+              <a:rPr lang="tr-TR" dirty="0"/>
+              <a:t>Bu komut, projenizin tarihçesini gösterir. Yani, projenizdeki yapılan her bir </a:t>
+            </a:r>
+            <a:r>
+              <a:rPr lang="tr-TR" dirty="0" err="1"/>
+              <a:t>commit'in</a:t>
+            </a:r>
+            <a:r>
+              <a:rPr lang="tr-TR" dirty="0"/>
+              <a:t> listesini ve bunların detaylarını gösterir. </a:t>
+            </a:r>
+            <a:r>
+              <a:rPr lang="tr-TR" dirty="0" err="1"/>
+              <a:t>Commitlerin</a:t>
+            </a:r>
+            <a:r>
+              <a:rPr lang="tr-TR" dirty="0"/>
+              <a:t> </a:t>
+            </a:r>
+            <a:r>
+              <a:rPr lang="tr-TR" dirty="0" err="1"/>
+              <a:t>hash'leri</a:t>
+            </a:r>
+            <a:r>
+              <a:rPr lang="tr-TR" dirty="0"/>
+              <a:t>, yazarları, tarihleri ve </a:t>
+            </a:r>
+            <a:r>
+              <a:rPr lang="tr-TR" dirty="0" err="1"/>
+              <a:t>commit</a:t>
+            </a:r>
+            <a:r>
+              <a:rPr lang="tr-TR" dirty="0"/>
+              <a:t> mesajları gibi bilgileri sağlar. Bu komut, projenin gelişimini takip etmek ve yapılan değişiklikleri incelemek için kullanılır.</a:t>
+            </a:r>
+          </a:p>
+        </p:txBody>
+      </p:sp>
+    </p:spTree>
+    <p:extLst>
+      <p:ext uri="{BB962C8B-B14F-4D97-AF65-F5344CB8AC3E}">
+        <p14:creationId xmlns:p14="http://schemas.microsoft.com/office/powerpoint/2010/main" val="3791637650"/>
+      </p:ext>
+    </p:extLst>
+  </p:cSld>
+  <p:clrMapOvr>
+    <a:masterClrMapping/>
+  </p:clrMapOvr>
+</p:sld>
+</file>
+
+<file path=ppt/slides/slide42.xml><?xml version="1.0" encoding="utf-8"?>
+<p:sld xmlns:a="http://schemas.openxmlformats.org/drawingml/2006/main" xmlns:r="http://schemas.openxmlformats.org/officeDocument/2006/relationships" xmlns:p="http://schemas.openxmlformats.org/presentationml/2006/main">
+  <p:cSld>
+    <p:spTree>
+      <p:nvGrpSpPr>
+        <p:cNvPr id="1" name=""/>
+        <p:cNvGrpSpPr/>
+        <p:nvPr/>
+      </p:nvGrpSpPr>
+      <p:grpSpPr>
+        <a:xfrm>
+          <a:off x="0" y="0"/>
+          <a:ext cx="0" cy="0"/>
+          <a:chOff x="0" y="0"/>
+          <a:chExt cx="0" cy="0"/>
+        </a:xfrm>
+      </p:grpSpPr>
+      <p:sp>
+        <p:nvSpPr>
+          <p:cNvPr id="2" name="Başlık 1">
+            <a:extLst>
+              <a:ext uri="{FF2B5EF4-FFF2-40B4-BE49-F238E27FC236}">
+                <a16:creationId xmlns:a16="http://schemas.microsoft.com/office/drawing/2014/main" id="{565419AF-7C35-4B71-BF59-151441A4B4C0}"/>
+              </a:ext>
+            </a:extLst>
+          </p:cNvPr>
+          <p:cNvSpPr>
+            <a:spLocks noGrp="1"/>
+          </p:cNvSpPr>
+          <p:nvPr>
+            <p:ph type="title"/>
+          </p:nvPr>
+        </p:nvSpPr>
+        <p:spPr/>
+        <p:txBody>
+          <a:bodyPr/>
+          <a:lstStyle/>
+          <a:p>
+            <a:pPr algn="ctr"/>
+            <a:r>
+              <a:rPr lang="tr-TR" dirty="0"/>
+              <a:t>«git </a:t>
+            </a:r>
+            <a:r>
+              <a:rPr lang="tr-TR" dirty="0" err="1"/>
+              <a:t>status</a:t>
+            </a:r>
+            <a:r>
+              <a:rPr lang="tr-TR" dirty="0"/>
+              <a:t>» Komutu</a:t>
+            </a:r>
+          </a:p>
+        </p:txBody>
+      </p:sp>
+      <p:sp>
+        <p:nvSpPr>
+          <p:cNvPr id="3" name="İçerik Yer Tutucusu 2">
+            <a:extLst>
+              <a:ext uri="{FF2B5EF4-FFF2-40B4-BE49-F238E27FC236}">
+                <a16:creationId xmlns:a16="http://schemas.microsoft.com/office/drawing/2014/main" id="{F87FDC72-C048-4A7A-A1C4-F1C64DDB5CF0}"/>
+              </a:ext>
+            </a:extLst>
+          </p:cNvPr>
+          <p:cNvSpPr>
+            <a:spLocks noGrp="1"/>
+          </p:cNvSpPr>
+          <p:nvPr>
+            <p:ph idx="1"/>
+          </p:nvPr>
+        </p:nvSpPr>
+        <p:spPr/>
+        <p:txBody>
+          <a:bodyPr>
+            <a:normAutofit/>
+          </a:bodyPr>
+          <a:lstStyle/>
+          <a:p>
+            <a:r>
+              <a:rPr lang="tr-TR" dirty="0"/>
+              <a:t>Bu komut, projenizin mevcut durumu hakkında bilgi verir. Hangi dosyaların değiştirildiğini, hangilerinin </a:t>
+            </a:r>
+            <a:r>
+              <a:rPr lang="tr-TR" dirty="0" err="1"/>
+              <a:t>staged</a:t>
+            </a:r>
+            <a:r>
+              <a:rPr lang="tr-TR" dirty="0"/>
+              <a:t> </a:t>
+            </a:r>
+            <a:r>
+              <a:rPr lang="tr-TR" dirty="0" err="1"/>
+              <a:t>area'ya</a:t>
+            </a:r>
+            <a:r>
+              <a:rPr lang="tr-TR" dirty="0"/>
+              <a:t> eklenmiş olduğunu ve hangilerinin henüz takip edilmediğini (</a:t>
+            </a:r>
+            <a:r>
+              <a:rPr lang="tr-TR" dirty="0" err="1"/>
+              <a:t>untracked</a:t>
+            </a:r>
+            <a:r>
+              <a:rPr lang="tr-TR" dirty="0"/>
+              <a:t>) gösterir. Bu komut, çalışma dizininizdeki değişiklikleri gözden geçirmenize ve bunları takip etmenize yardımcı olur. Bu şekilde, hangi dosyaların </a:t>
+            </a:r>
+            <a:r>
+              <a:rPr lang="tr-TR" dirty="0" err="1"/>
+              <a:t>commit</a:t>
+            </a:r>
+            <a:r>
+              <a:rPr lang="tr-TR" dirty="0"/>
+              <a:t> edilmesi gerektiğini veya hangilerinin dikkate alınması gerektiğini belirleyebilirsiniz.</a:t>
+            </a:r>
+          </a:p>
+        </p:txBody>
+      </p:sp>
+    </p:spTree>
+    <p:extLst>
+      <p:ext uri="{BB962C8B-B14F-4D97-AF65-F5344CB8AC3E}">
+        <p14:creationId xmlns:p14="http://schemas.microsoft.com/office/powerpoint/2010/main" val="3939863029"/>
       </p:ext>
     </p:extLst>
   </p:cSld>

</xml_diff>

<commit_message>
Git GUI ve CLI Sunuma Eklendi
</commit_message>
<xml_diff>
--- a/DevOps Proje Sunusu.pptx
+++ b/DevOps Proje Sunusu.pptx
@@ -47,6 +47,8 @@
     <p:sldId id="295" r:id="rId41"/>
     <p:sldId id="296" r:id="rId42"/>
     <p:sldId id="297" r:id="rId43"/>
+    <p:sldId id="298" r:id="rId44"/>
+    <p:sldId id="299" r:id="rId45"/>
   </p:sldIdLst>
   <p:sldSz cx="12192000" cy="6858000"/>
   <p:notesSz cx="6858000" cy="9144000"/>
@@ -6550,6 +6552,240 @@
     <p:extLst>
       <p:ext uri="{BB962C8B-B14F-4D97-AF65-F5344CB8AC3E}">
         <p14:creationId xmlns:p14="http://schemas.microsoft.com/office/powerpoint/2010/main" val="3939863029"/>
+      </p:ext>
+    </p:extLst>
+  </p:cSld>
+  <p:clrMapOvr>
+    <a:masterClrMapping/>
+  </p:clrMapOvr>
+</p:sld>
+</file>
+
+<file path=ppt/slides/slide43.xml><?xml version="1.0" encoding="utf-8"?>
+<p:sld xmlns:a="http://schemas.openxmlformats.org/drawingml/2006/main" xmlns:r="http://schemas.openxmlformats.org/officeDocument/2006/relationships" xmlns:p="http://schemas.openxmlformats.org/presentationml/2006/main">
+  <p:cSld>
+    <p:spTree>
+      <p:nvGrpSpPr>
+        <p:cNvPr id="1" name=""/>
+        <p:cNvGrpSpPr/>
+        <p:nvPr/>
+      </p:nvGrpSpPr>
+      <p:grpSpPr>
+        <a:xfrm>
+          <a:off x="0" y="0"/>
+          <a:ext cx="0" cy="0"/>
+          <a:chOff x="0" y="0"/>
+          <a:chExt cx="0" cy="0"/>
+        </a:xfrm>
+      </p:grpSpPr>
+      <p:sp>
+        <p:nvSpPr>
+          <p:cNvPr id="2" name="Başlık 1">
+            <a:extLst>
+              <a:ext uri="{FF2B5EF4-FFF2-40B4-BE49-F238E27FC236}">
+                <a16:creationId xmlns:a16="http://schemas.microsoft.com/office/drawing/2014/main" id="{B73E0A89-2DDC-4A8C-8E74-3DC9457E0DA9}"/>
+              </a:ext>
+            </a:extLst>
+          </p:cNvPr>
+          <p:cNvSpPr>
+            <a:spLocks noGrp="1"/>
+          </p:cNvSpPr>
+          <p:nvPr>
+            <p:ph type="title"/>
+          </p:nvPr>
+        </p:nvSpPr>
+        <p:spPr/>
+        <p:txBody>
+          <a:bodyPr/>
+          <a:lstStyle/>
+          <a:p>
+            <a:pPr algn="ctr"/>
+            <a:r>
+              <a:rPr lang="tr-TR" dirty="0"/>
+              <a:t>Git GUI Nedir?</a:t>
+            </a:r>
+          </a:p>
+        </p:txBody>
+      </p:sp>
+      <p:sp>
+        <p:nvSpPr>
+          <p:cNvPr id="3" name="İçerik Yer Tutucusu 2">
+            <a:extLst>
+              <a:ext uri="{FF2B5EF4-FFF2-40B4-BE49-F238E27FC236}">
+                <a16:creationId xmlns:a16="http://schemas.microsoft.com/office/drawing/2014/main" id="{42A2E506-5EAF-44D0-95CA-964A03AD1504}"/>
+              </a:ext>
+            </a:extLst>
+          </p:cNvPr>
+          <p:cNvSpPr>
+            <a:spLocks noGrp="1"/>
+          </p:cNvSpPr>
+          <p:nvPr>
+            <p:ph idx="1"/>
+          </p:nvPr>
+        </p:nvSpPr>
+        <p:spPr/>
+        <p:txBody>
+          <a:bodyPr>
+            <a:normAutofit/>
+          </a:bodyPr>
+          <a:lstStyle/>
+          <a:p>
+            <a:r>
+              <a:rPr lang="tr-TR" dirty="0" err="1"/>
+              <a:t>Git'in</a:t>
+            </a:r>
+            <a:r>
+              <a:rPr lang="tr-TR" dirty="0"/>
+              <a:t> grafik </a:t>
+            </a:r>
+            <a:r>
+              <a:rPr lang="tr-TR" dirty="0" err="1"/>
+              <a:t>arayüzüdür</a:t>
+            </a:r>
+            <a:r>
+              <a:rPr lang="tr-TR" dirty="0"/>
+              <a:t>. Kullanıcıların </a:t>
+            </a:r>
+            <a:r>
+              <a:rPr lang="tr-TR" dirty="0" err="1"/>
+              <a:t>Git'in</a:t>
+            </a:r>
+            <a:r>
+              <a:rPr lang="tr-TR" dirty="0"/>
+              <a:t> işlevlerini görsel bir şekilde yönetmelerine olanak tanır. Bu tür araçlar, dosya değişikliklerini görsel olarak inceleme, </a:t>
+            </a:r>
+            <a:r>
+              <a:rPr lang="tr-TR" dirty="0" err="1"/>
+              <a:t>commit'ler</a:t>
+            </a:r>
+            <a:r>
+              <a:rPr lang="tr-TR" dirty="0"/>
+              <a:t> oluşturma, dal oluşturma ve birleştirme gibi temel Git işlemlerini yapmanıza yardımcı olur. Git GUI araçları, daha az teknik bilgiye sahip kullanıcılar için </a:t>
+            </a:r>
+            <a:r>
+              <a:rPr lang="tr-TR" dirty="0" err="1"/>
+              <a:t>Git'in</a:t>
+            </a:r>
+            <a:r>
+              <a:rPr lang="tr-TR" dirty="0"/>
+              <a:t> kullanımını kolaylaştırabilir.</a:t>
+            </a:r>
+          </a:p>
+        </p:txBody>
+      </p:sp>
+    </p:spTree>
+    <p:extLst>
+      <p:ext uri="{BB962C8B-B14F-4D97-AF65-F5344CB8AC3E}">
+        <p14:creationId xmlns:p14="http://schemas.microsoft.com/office/powerpoint/2010/main" val="1831105607"/>
+      </p:ext>
+    </p:extLst>
+  </p:cSld>
+  <p:clrMapOvr>
+    <a:masterClrMapping/>
+  </p:clrMapOvr>
+</p:sld>
+</file>
+
+<file path=ppt/slides/slide44.xml><?xml version="1.0" encoding="utf-8"?>
+<p:sld xmlns:a="http://schemas.openxmlformats.org/drawingml/2006/main" xmlns:r="http://schemas.openxmlformats.org/officeDocument/2006/relationships" xmlns:p="http://schemas.openxmlformats.org/presentationml/2006/main">
+  <p:cSld>
+    <p:spTree>
+      <p:nvGrpSpPr>
+        <p:cNvPr id="1" name=""/>
+        <p:cNvGrpSpPr/>
+        <p:nvPr/>
+      </p:nvGrpSpPr>
+      <p:grpSpPr>
+        <a:xfrm>
+          <a:off x="0" y="0"/>
+          <a:ext cx="0" cy="0"/>
+          <a:chOff x="0" y="0"/>
+          <a:chExt cx="0" cy="0"/>
+        </a:xfrm>
+      </p:grpSpPr>
+      <p:sp>
+        <p:nvSpPr>
+          <p:cNvPr id="2" name="Başlık 1">
+            <a:extLst>
+              <a:ext uri="{FF2B5EF4-FFF2-40B4-BE49-F238E27FC236}">
+                <a16:creationId xmlns:a16="http://schemas.microsoft.com/office/drawing/2014/main" id="{5E6C72EE-8C59-4418-86AE-319E15A2B3D3}"/>
+              </a:ext>
+            </a:extLst>
+          </p:cNvPr>
+          <p:cNvSpPr>
+            <a:spLocks noGrp="1"/>
+          </p:cNvSpPr>
+          <p:nvPr>
+            <p:ph type="title"/>
+          </p:nvPr>
+        </p:nvSpPr>
+        <p:spPr/>
+        <p:txBody>
+          <a:bodyPr/>
+          <a:lstStyle/>
+          <a:p>
+            <a:pPr algn="ctr"/>
+            <a:r>
+              <a:rPr lang="tr-TR" dirty="0"/>
+              <a:t>Git CLI Nedir?</a:t>
+            </a:r>
+          </a:p>
+        </p:txBody>
+      </p:sp>
+      <p:sp>
+        <p:nvSpPr>
+          <p:cNvPr id="3" name="İçerik Yer Tutucusu 2">
+            <a:extLst>
+              <a:ext uri="{FF2B5EF4-FFF2-40B4-BE49-F238E27FC236}">
+                <a16:creationId xmlns:a16="http://schemas.microsoft.com/office/drawing/2014/main" id="{8AD1AF04-261A-486F-A166-25FB6833FA0E}"/>
+              </a:ext>
+            </a:extLst>
+          </p:cNvPr>
+          <p:cNvSpPr>
+            <a:spLocks noGrp="1"/>
+          </p:cNvSpPr>
+          <p:nvPr>
+            <p:ph idx="1"/>
+          </p:nvPr>
+        </p:nvSpPr>
+        <p:spPr/>
+        <p:txBody>
+          <a:bodyPr>
+            <a:normAutofit/>
+          </a:bodyPr>
+          <a:lstStyle/>
+          <a:p>
+            <a:r>
+              <a:rPr lang="tr-TR" dirty="0" err="1"/>
+              <a:t>Git'in</a:t>
+            </a:r>
+            <a:r>
+              <a:rPr lang="tr-TR" dirty="0"/>
+              <a:t> komut satırı </a:t>
+            </a:r>
+            <a:r>
+              <a:rPr lang="tr-TR" dirty="0" err="1"/>
+              <a:t>arayüzüdür</a:t>
+            </a:r>
+            <a:r>
+              <a:rPr lang="tr-TR" dirty="0"/>
+              <a:t>. Kullanıcıların Git komutlarını doğrudan terminal veya komut istemcisinden çalıştırmalarını sağlar. Git CLI, dosya değişikliklerini izleme, </a:t>
+            </a:r>
+            <a:r>
+              <a:rPr lang="tr-TR" dirty="0" err="1"/>
+              <a:t>commit'ler</a:t>
+            </a:r>
+            <a:r>
+              <a:rPr lang="tr-TR" dirty="0"/>
+              <a:t> oluşturma, dal oluşturma, birleştirme, uzak depolarla etkileşim ve diğer Git işlemlerini gerçekleştirmek için kullanılır. Genellikle daha teknik bilgiye sahip kullanıcılar ve otomasyon için tercih edilir.</a:t>
+            </a:r>
+          </a:p>
+        </p:txBody>
+      </p:sp>
+    </p:spTree>
+    <p:extLst>
+      <p:ext uri="{BB962C8B-B14F-4D97-AF65-F5344CB8AC3E}">
+        <p14:creationId xmlns:p14="http://schemas.microsoft.com/office/powerpoint/2010/main" val="1318017426"/>
       </p:ext>
     </p:extLst>
   </p:cSld>

</xml_diff>

<commit_message>
Branch Backend ve Merge Fast-forward Sunuya Eklendi
</commit_message>
<xml_diff>
--- a/DevOps Proje Sunusu.pptx
+++ b/DevOps Proje Sunusu.pptx
@@ -6579,6 +6579,101 @@
           <a:chExt cx="0" cy="0"/>
         </a:xfrm>
       </p:grpSpPr>
+      <p:sp>
+        <p:nvSpPr>
+          <p:cNvPr id="2" name="Başlık 1">
+            <a:extLst>
+              <a:ext uri="{FF2B5EF4-FFF2-40B4-BE49-F238E27FC236}">
+                <a16:creationId xmlns:a16="http://schemas.microsoft.com/office/drawing/2014/main" id="{E2E36DC2-76CA-40C4-BB07-E91474FCBE8C}"/>
+              </a:ext>
+            </a:extLst>
+          </p:cNvPr>
+          <p:cNvSpPr>
+            <a:spLocks noGrp="1"/>
+          </p:cNvSpPr>
+          <p:nvPr>
+            <p:ph type="title"/>
+          </p:nvPr>
+        </p:nvSpPr>
+        <p:spPr>
+          <a:xfrm>
+            <a:off x="838200" y="28107"/>
+            <a:ext cx="10515600" cy="1325563"/>
+          </a:xfrm>
+        </p:spPr>
+        <p:txBody>
+          <a:bodyPr/>
+          <a:lstStyle/>
+          <a:p>
+            <a:pPr algn="ctr"/>
+            <a:r>
+              <a:rPr lang="tr-TR" dirty="0" err="1"/>
+              <a:t>Branch</a:t>
+            </a:r>
+            <a:r>
+              <a:rPr lang="tr-TR" dirty="0"/>
+              <a:t> </a:t>
+            </a:r>
+            <a:r>
+              <a:rPr lang="tr-TR" dirty="0" err="1"/>
+              <a:t>Backend</a:t>
+            </a:r>
+            <a:r>
+              <a:rPr lang="tr-TR" dirty="0"/>
+              <a:t> ve </a:t>
+            </a:r>
+            <a:r>
+              <a:rPr lang="tr-TR" dirty="0" err="1"/>
+              <a:t>Merge</a:t>
+            </a:r>
+            <a:r>
+              <a:rPr lang="tr-TR" dirty="0"/>
+              <a:t> </a:t>
+            </a:r>
+            <a:r>
+              <a:rPr lang="tr-TR" dirty="0" err="1"/>
+              <a:t>Fast-forward</a:t>
+            </a:r>
+            <a:endParaRPr lang="tr-TR" dirty="0"/>
+          </a:p>
+        </p:txBody>
+      </p:sp>
+      <p:pic>
+        <p:nvPicPr>
+          <p:cNvPr id="4" name="Resim 3">
+            <a:extLst>
+              <a:ext uri="{FF2B5EF4-FFF2-40B4-BE49-F238E27FC236}">
+                <a16:creationId xmlns:a16="http://schemas.microsoft.com/office/drawing/2014/main" id="{AFAB5F63-A190-45FD-9AFC-7D01A2280247}"/>
+              </a:ext>
+            </a:extLst>
+          </p:cNvPr>
+          <p:cNvPicPr>
+            <a:picLocks noChangeAspect="1"/>
+          </p:cNvPicPr>
+          <p:nvPr/>
+        </p:nvPicPr>
+        <p:blipFill>
+          <a:blip r:embed="rId2">
+            <a:extLst>
+              <a:ext uri="{28A0092B-C50C-407E-A947-70E740481C1C}">
+                <a14:useLocalDpi xmlns:a14="http://schemas.microsoft.com/office/drawing/2010/main" val="0"/>
+              </a:ext>
+            </a:extLst>
+          </a:blip>
+          <a:stretch>
+            <a:fillRect/>
+          </a:stretch>
+        </p:blipFill>
+        <p:spPr>
+          <a:xfrm>
+            <a:off x="4124410" y="1353670"/>
+            <a:ext cx="3943180" cy="5504329"/>
+          </a:xfrm>
+          <a:prstGeom prst="rect">
+            <a:avLst/>
+          </a:prstGeom>
+        </p:spPr>
+      </p:pic>
     </p:spTree>
     <p:extLst>
       <p:ext uri="{BB962C8B-B14F-4D97-AF65-F5344CB8AC3E}">

</xml_diff>

<commit_message>
Branch Frontend ve Merge No-fast-forward Sunuya Eklendi
</commit_message>
<xml_diff>
--- a/DevOps Proje Sunusu.pptx
+++ b/DevOps Proje Sunusu.pptx
@@ -6939,6 +6939,109 @@
           <a:chExt cx="0" cy="0"/>
         </a:xfrm>
       </p:grpSpPr>
+      <p:sp>
+        <p:nvSpPr>
+          <p:cNvPr id="2" name="Başlık 1">
+            <a:extLst>
+              <a:ext uri="{FF2B5EF4-FFF2-40B4-BE49-F238E27FC236}">
+                <a16:creationId xmlns:a16="http://schemas.microsoft.com/office/drawing/2014/main" id="{47991AC4-394C-4B2E-906C-011547E3F6C1}"/>
+              </a:ext>
+            </a:extLst>
+          </p:cNvPr>
+          <p:cNvSpPr>
+            <a:spLocks noGrp="1"/>
+          </p:cNvSpPr>
+          <p:nvPr>
+            <p:ph type="title"/>
+          </p:nvPr>
+        </p:nvSpPr>
+        <p:spPr>
+          <a:xfrm>
+            <a:off x="838199" y="0"/>
+            <a:ext cx="10515600" cy="1325563"/>
+          </a:xfrm>
+        </p:spPr>
+        <p:txBody>
+          <a:bodyPr/>
+          <a:lstStyle/>
+          <a:p>
+            <a:pPr algn="ctr"/>
+            <a:r>
+              <a:rPr lang="tr-TR" dirty="0" err="1"/>
+              <a:t>Branch</a:t>
+            </a:r>
+            <a:r>
+              <a:rPr lang="tr-TR" dirty="0"/>
+              <a:t> </a:t>
+            </a:r>
+            <a:r>
+              <a:rPr lang="tr-TR" dirty="0" err="1"/>
+              <a:t>Frontend</a:t>
+            </a:r>
+            <a:r>
+              <a:rPr lang="tr-TR" dirty="0"/>
+              <a:t> ve </a:t>
+            </a:r>
+            <a:r>
+              <a:rPr lang="tr-TR" dirty="0" err="1"/>
+              <a:t>Merge</a:t>
+            </a:r>
+            <a:r>
+              <a:rPr lang="tr-TR" dirty="0"/>
+              <a:t> No-</a:t>
+            </a:r>
+            <a:r>
+              <a:rPr lang="tr-TR" dirty="0" err="1"/>
+              <a:t>fast</a:t>
+            </a:r>
+            <a:r>
+              <a:rPr lang="tr-TR" dirty="0"/>
+              <a:t>-</a:t>
+            </a:r>
+            <a:r>
+              <a:rPr lang="tr-TR" dirty="0" err="1"/>
+              <a:t>forward</a:t>
+            </a:r>
+            <a:endParaRPr lang="tr-TR" dirty="0"/>
+          </a:p>
+        </p:txBody>
+      </p:sp>
+      <p:pic>
+        <p:nvPicPr>
+          <p:cNvPr id="4" name="Resim 3">
+            <a:extLst>
+              <a:ext uri="{FF2B5EF4-FFF2-40B4-BE49-F238E27FC236}">
+                <a16:creationId xmlns:a16="http://schemas.microsoft.com/office/drawing/2014/main" id="{2555CB83-3809-4043-8553-9CF5584F2785}"/>
+              </a:ext>
+            </a:extLst>
+          </p:cNvPr>
+          <p:cNvPicPr>
+            <a:picLocks noChangeAspect="1"/>
+          </p:cNvPicPr>
+          <p:nvPr/>
+        </p:nvPicPr>
+        <p:blipFill>
+          <a:blip r:embed="rId2">
+            <a:extLst>
+              <a:ext uri="{28A0092B-C50C-407E-A947-70E740481C1C}">
+                <a14:useLocalDpi xmlns:a14="http://schemas.microsoft.com/office/drawing/2010/main" val="0"/>
+              </a:ext>
+            </a:extLst>
+          </a:blip>
+          <a:stretch>
+            <a:fillRect/>
+          </a:stretch>
+        </p:blipFill>
+        <p:spPr>
+          <a:xfrm>
+            <a:off x="3965251" y="1325563"/>
+            <a:ext cx="4261495" cy="5532436"/>
+          </a:xfrm>
+          <a:prstGeom prst="rect">
+            <a:avLst/>
+          </a:prstGeom>
+        </p:spPr>
+      </p:pic>
     </p:spTree>
     <p:extLst>
       <p:ext uri="{BB962C8B-B14F-4D97-AF65-F5344CB8AC3E}">

</xml_diff>

<commit_message>
Git Stash Kavramı Sunuya Eklendi
</commit_message>
<xml_diff>
--- a/DevOps Proje Sunusu.pptx
+++ b/DevOps Proje Sunusu.pptx
@@ -51,6 +51,7 @@
     <p:sldId id="298" r:id="rId45"/>
     <p:sldId id="299" r:id="rId46"/>
     <p:sldId id="301" r:id="rId47"/>
+    <p:sldId id="302" r:id="rId48"/>
   </p:sldIdLst>
   <p:sldSz cx="12192000" cy="6858000"/>
   <p:notesSz cx="6858000" cy="9144000"/>
@@ -7046,6 +7047,119 @@
     <p:extLst>
       <p:ext uri="{BB962C8B-B14F-4D97-AF65-F5344CB8AC3E}">
         <p14:creationId xmlns:p14="http://schemas.microsoft.com/office/powerpoint/2010/main" val="4078705898"/>
+      </p:ext>
+    </p:extLst>
+  </p:cSld>
+  <p:clrMapOvr>
+    <a:masterClrMapping/>
+  </p:clrMapOvr>
+</p:sld>
+</file>
+
+<file path=ppt/slides/slide47.xml><?xml version="1.0" encoding="utf-8"?>
+<p:sld xmlns:a="http://schemas.openxmlformats.org/drawingml/2006/main" xmlns:r="http://schemas.openxmlformats.org/officeDocument/2006/relationships" xmlns:p="http://schemas.openxmlformats.org/presentationml/2006/main">
+  <p:cSld>
+    <p:spTree>
+      <p:nvGrpSpPr>
+        <p:cNvPr id="1" name=""/>
+        <p:cNvGrpSpPr/>
+        <p:nvPr/>
+      </p:nvGrpSpPr>
+      <p:grpSpPr>
+        <a:xfrm>
+          <a:off x="0" y="0"/>
+          <a:ext cx="0" cy="0"/>
+          <a:chOff x="0" y="0"/>
+          <a:chExt cx="0" cy="0"/>
+        </a:xfrm>
+      </p:grpSpPr>
+      <p:sp>
+        <p:nvSpPr>
+          <p:cNvPr id="3" name="Başlık 2">
+            <a:extLst>
+              <a:ext uri="{FF2B5EF4-FFF2-40B4-BE49-F238E27FC236}">
+                <a16:creationId xmlns:a16="http://schemas.microsoft.com/office/drawing/2014/main" id="{7F9D46DD-72CD-4D29-8009-4D49436F40C8}"/>
+              </a:ext>
+            </a:extLst>
+          </p:cNvPr>
+          <p:cNvSpPr>
+            <a:spLocks noGrp="1"/>
+          </p:cNvSpPr>
+          <p:nvPr>
+            <p:ph type="title"/>
+          </p:nvPr>
+        </p:nvSpPr>
+        <p:spPr/>
+        <p:txBody>
+          <a:bodyPr/>
+          <a:lstStyle/>
+          <a:p>
+            <a:pPr algn="ctr"/>
+            <a:r>
+              <a:rPr lang="tr-TR" dirty="0"/>
+              <a:t>Git </a:t>
+            </a:r>
+            <a:r>
+              <a:rPr lang="tr-TR" dirty="0" err="1"/>
+              <a:t>Stash</a:t>
+            </a:r>
+            <a:r>
+              <a:rPr lang="tr-TR" dirty="0"/>
+              <a:t> Nedir?</a:t>
+            </a:r>
+          </a:p>
+        </p:txBody>
+      </p:sp>
+      <p:sp>
+        <p:nvSpPr>
+          <p:cNvPr id="4" name="İçerik Yer Tutucusu 3">
+            <a:extLst>
+              <a:ext uri="{FF2B5EF4-FFF2-40B4-BE49-F238E27FC236}">
+                <a16:creationId xmlns:a16="http://schemas.microsoft.com/office/drawing/2014/main" id="{57C533AD-829A-4968-B6C8-622E07A0F5E1}"/>
+              </a:ext>
+            </a:extLst>
+          </p:cNvPr>
+          <p:cNvSpPr>
+            <a:spLocks noGrp="1"/>
+          </p:cNvSpPr>
+          <p:nvPr>
+            <p:ph idx="1"/>
+          </p:nvPr>
+        </p:nvSpPr>
+        <p:spPr/>
+        <p:txBody>
+          <a:bodyPr>
+            <a:normAutofit/>
+          </a:bodyPr>
+          <a:lstStyle/>
+          <a:p>
+            <a:r>
+              <a:rPr lang="tr-TR" dirty="0"/>
+              <a:t>Git </a:t>
+            </a:r>
+            <a:r>
+              <a:rPr lang="tr-TR" dirty="0" err="1"/>
+              <a:t>stash</a:t>
+            </a:r>
+            <a:r>
+              <a:rPr lang="tr-TR" dirty="0"/>
+              <a:t>, mevcut çalışma dizinindeki değişiklikleri geçici olarak saklamak için kullanılan bir mekanizmadır. Özellikle, üzerinde çalıştığınız bir dalda olmayan ve henüz </a:t>
+            </a:r>
+            <a:r>
+              <a:rPr lang="tr-TR" dirty="0" err="1"/>
+              <a:t>commit</a:t>
+            </a:r>
+            <a:r>
+              <a:rPr lang="tr-TR" dirty="0"/>
+              <a:t> etmek istemediğiniz değişiklikleri geçici olarak saklamak için kullanılır. Bu sayede, başka bir dalda çalışmak veya başka bir işle uğraşmak istediğinizde, mevcut değişikliklerinizi saklayabilir ve daha sonra geri alabilirsiniz.</a:t>
+            </a:r>
+          </a:p>
+        </p:txBody>
+      </p:sp>
+    </p:spTree>
+    <p:extLst>
+      <p:ext uri="{BB962C8B-B14F-4D97-AF65-F5344CB8AC3E}">
+        <p14:creationId xmlns:p14="http://schemas.microsoft.com/office/powerpoint/2010/main" val="3729148455"/>
       </p:ext>
     </p:extLst>
   </p:cSld>

</xml_diff>

<commit_message>
Alias Kullanarak Kod Kısaltma Sunuya Eklendi
</commit_message>
<xml_diff>
--- a/DevOps Proje Sunusu.pptx
+++ b/DevOps Proje Sunusu.pptx
@@ -52,6 +52,7 @@
     <p:sldId id="299" r:id="rId46"/>
     <p:sldId id="301" r:id="rId47"/>
     <p:sldId id="302" r:id="rId48"/>
+    <p:sldId id="303" r:id="rId49"/>
   </p:sldIdLst>
   <p:sldSz cx="12192000" cy="6858000"/>
   <p:notesSz cx="6858000" cy="9144000"/>
@@ -7160,6 +7161,105 @@
     <p:extLst>
       <p:ext uri="{BB962C8B-B14F-4D97-AF65-F5344CB8AC3E}">
         <p14:creationId xmlns:p14="http://schemas.microsoft.com/office/powerpoint/2010/main" val="3729148455"/>
+      </p:ext>
+    </p:extLst>
+  </p:cSld>
+  <p:clrMapOvr>
+    <a:masterClrMapping/>
+  </p:clrMapOvr>
+</p:sld>
+</file>
+
+<file path=ppt/slides/slide48.xml><?xml version="1.0" encoding="utf-8"?>
+<p:sld xmlns:a="http://schemas.openxmlformats.org/drawingml/2006/main" xmlns:r="http://schemas.openxmlformats.org/officeDocument/2006/relationships" xmlns:p="http://schemas.openxmlformats.org/presentationml/2006/main">
+  <p:cSld>
+    <p:spTree>
+      <p:nvGrpSpPr>
+        <p:cNvPr id="1" name=""/>
+        <p:cNvGrpSpPr/>
+        <p:nvPr/>
+      </p:nvGrpSpPr>
+      <p:grpSpPr>
+        <a:xfrm>
+          <a:off x="0" y="0"/>
+          <a:ext cx="0" cy="0"/>
+          <a:chOff x="0" y="0"/>
+          <a:chExt cx="0" cy="0"/>
+        </a:xfrm>
+      </p:grpSpPr>
+      <p:sp>
+        <p:nvSpPr>
+          <p:cNvPr id="2" name="Başlık 1">
+            <a:extLst>
+              <a:ext uri="{FF2B5EF4-FFF2-40B4-BE49-F238E27FC236}">
+                <a16:creationId xmlns:a16="http://schemas.microsoft.com/office/drawing/2014/main" id="{E881FDB4-97D3-4620-9D11-96095AF8FCC7}"/>
+              </a:ext>
+            </a:extLst>
+          </p:cNvPr>
+          <p:cNvSpPr>
+            <a:spLocks noGrp="1"/>
+          </p:cNvSpPr>
+          <p:nvPr>
+            <p:ph type="title"/>
+          </p:nvPr>
+        </p:nvSpPr>
+        <p:spPr/>
+        <p:txBody>
+          <a:bodyPr/>
+          <a:lstStyle/>
+          <a:p>
+            <a:pPr algn="ctr"/>
+            <a:r>
+              <a:rPr lang="tr-TR" dirty="0" err="1"/>
+              <a:t>Alias</a:t>
+            </a:r>
+            <a:r>
+              <a:rPr lang="tr-TR" dirty="0"/>
+              <a:t> Kullanarak Kod Kısaltma</a:t>
+            </a:r>
+          </a:p>
+        </p:txBody>
+      </p:sp>
+      <p:pic>
+        <p:nvPicPr>
+          <p:cNvPr id="5" name="Resim 4">
+            <a:extLst>
+              <a:ext uri="{FF2B5EF4-FFF2-40B4-BE49-F238E27FC236}">
+                <a16:creationId xmlns:a16="http://schemas.microsoft.com/office/drawing/2014/main" id="{FF198650-F6E6-4E8A-87C0-CDDA8DBE4D24}"/>
+              </a:ext>
+            </a:extLst>
+          </p:cNvPr>
+          <p:cNvPicPr>
+            <a:picLocks noChangeAspect="1"/>
+          </p:cNvPicPr>
+          <p:nvPr/>
+        </p:nvPicPr>
+        <p:blipFill>
+          <a:blip r:embed="rId2">
+            <a:extLst>
+              <a:ext uri="{28A0092B-C50C-407E-A947-70E740481C1C}">
+                <a14:useLocalDpi xmlns:a14="http://schemas.microsoft.com/office/drawing/2010/main" val="0"/>
+              </a:ext>
+            </a:extLst>
+          </a:blip>
+          <a:stretch>
+            <a:fillRect/>
+          </a:stretch>
+        </p:blipFill>
+        <p:spPr>
+          <a:xfrm>
+            <a:off x="3101788" y="2214283"/>
+            <a:ext cx="5988423" cy="3361764"/>
+          </a:xfrm>
+          <a:prstGeom prst="rect">
+            <a:avLst/>
+          </a:prstGeom>
+        </p:spPr>
+      </p:pic>
+    </p:spTree>
+    <p:extLst>
+      <p:ext uri="{BB962C8B-B14F-4D97-AF65-F5344CB8AC3E}">
+        <p14:creationId xmlns:p14="http://schemas.microsoft.com/office/powerpoint/2010/main" val="571096739"/>
       </p:ext>
     </p:extLst>
   </p:cSld>

</xml_diff>

<commit_message>
Git Stash Ugulaması Sunuya Eklendi
</commit_message>
<xml_diff>
--- a/DevOps Proje Sunusu.pptx
+++ b/DevOps Proje Sunusu.pptx
@@ -52,7 +52,8 @@
     <p:sldId id="299" r:id="rId46"/>
     <p:sldId id="301" r:id="rId47"/>
     <p:sldId id="302" r:id="rId48"/>
-    <p:sldId id="303" r:id="rId49"/>
+    <p:sldId id="304" r:id="rId49"/>
+    <p:sldId id="303" r:id="rId50"/>
   </p:sldIdLst>
   <p:sldSz cx="12192000" cy="6858000"/>
   <p:notesSz cx="6858000" cy="9144000"/>
@@ -306,7 +307,7 @@
           <a:p>
             <a:fld id="{DBDEE6A1-7115-4181-8644-D9EB52B994FD}" type="datetimeFigureOut">
               <a:rPr lang="tr-TR" smtClean="0"/>
-              <a:t>12.03.2024</a:t>
+              <a:t>13.03.2024</a:t>
             </a:fld>
             <a:endParaRPr lang="tr-TR"/>
           </a:p>
@@ -504,7 +505,7 @@
           <a:p>
             <a:fld id="{DBDEE6A1-7115-4181-8644-D9EB52B994FD}" type="datetimeFigureOut">
               <a:rPr lang="tr-TR" smtClean="0"/>
-              <a:t>12.03.2024</a:t>
+              <a:t>13.03.2024</a:t>
             </a:fld>
             <a:endParaRPr lang="tr-TR"/>
           </a:p>
@@ -712,7 +713,7 @@
           <a:p>
             <a:fld id="{DBDEE6A1-7115-4181-8644-D9EB52B994FD}" type="datetimeFigureOut">
               <a:rPr lang="tr-TR" smtClean="0"/>
-              <a:t>12.03.2024</a:t>
+              <a:t>13.03.2024</a:t>
             </a:fld>
             <a:endParaRPr lang="tr-TR"/>
           </a:p>
@@ -910,7 +911,7 @@
           <a:p>
             <a:fld id="{DBDEE6A1-7115-4181-8644-D9EB52B994FD}" type="datetimeFigureOut">
               <a:rPr lang="tr-TR" smtClean="0"/>
-              <a:t>12.03.2024</a:t>
+              <a:t>13.03.2024</a:t>
             </a:fld>
             <a:endParaRPr lang="tr-TR"/>
           </a:p>
@@ -1185,7 +1186,7 @@
           <a:p>
             <a:fld id="{DBDEE6A1-7115-4181-8644-D9EB52B994FD}" type="datetimeFigureOut">
               <a:rPr lang="tr-TR" smtClean="0"/>
-              <a:t>12.03.2024</a:t>
+              <a:t>13.03.2024</a:t>
             </a:fld>
             <a:endParaRPr lang="tr-TR"/>
           </a:p>
@@ -1450,7 +1451,7 @@
           <a:p>
             <a:fld id="{DBDEE6A1-7115-4181-8644-D9EB52B994FD}" type="datetimeFigureOut">
               <a:rPr lang="tr-TR" smtClean="0"/>
-              <a:t>12.03.2024</a:t>
+              <a:t>13.03.2024</a:t>
             </a:fld>
             <a:endParaRPr lang="tr-TR"/>
           </a:p>
@@ -1862,7 +1863,7 @@
           <a:p>
             <a:fld id="{DBDEE6A1-7115-4181-8644-D9EB52B994FD}" type="datetimeFigureOut">
               <a:rPr lang="tr-TR" smtClean="0"/>
-              <a:t>12.03.2024</a:t>
+              <a:t>13.03.2024</a:t>
             </a:fld>
             <a:endParaRPr lang="tr-TR"/>
           </a:p>
@@ -2003,7 +2004,7 @@
           <a:p>
             <a:fld id="{DBDEE6A1-7115-4181-8644-D9EB52B994FD}" type="datetimeFigureOut">
               <a:rPr lang="tr-TR" smtClean="0"/>
-              <a:t>12.03.2024</a:t>
+              <a:t>13.03.2024</a:t>
             </a:fld>
             <a:endParaRPr lang="tr-TR"/>
           </a:p>
@@ -2116,7 +2117,7 @@
           <a:p>
             <a:fld id="{DBDEE6A1-7115-4181-8644-D9EB52B994FD}" type="datetimeFigureOut">
               <a:rPr lang="tr-TR" smtClean="0"/>
-              <a:t>12.03.2024</a:t>
+              <a:t>13.03.2024</a:t>
             </a:fld>
             <a:endParaRPr lang="tr-TR"/>
           </a:p>
@@ -2427,7 +2428,7 @@
           <a:p>
             <a:fld id="{DBDEE6A1-7115-4181-8644-D9EB52B994FD}" type="datetimeFigureOut">
               <a:rPr lang="tr-TR" smtClean="0"/>
-              <a:t>12.03.2024</a:t>
+              <a:t>13.03.2024</a:t>
             </a:fld>
             <a:endParaRPr lang="tr-TR"/>
           </a:p>
@@ -2715,7 +2716,7 @@
           <a:p>
             <a:fld id="{DBDEE6A1-7115-4181-8644-D9EB52B994FD}" type="datetimeFigureOut">
               <a:rPr lang="tr-TR" smtClean="0"/>
-              <a:t>12.03.2024</a:t>
+              <a:t>13.03.2024</a:t>
             </a:fld>
             <a:endParaRPr lang="tr-TR"/>
           </a:p>
@@ -2956,7 +2957,7 @@
           <a:p>
             <a:fld id="{DBDEE6A1-7115-4181-8644-D9EB52B994FD}" type="datetimeFigureOut">
               <a:rPr lang="tr-TR" smtClean="0"/>
-              <a:t>12.03.2024</a:t>
+              <a:t>13.03.2024</a:t>
             </a:fld>
             <a:endParaRPr lang="tr-TR"/>
           </a:p>
@@ -7171,6 +7172,119 @@
 </file>
 
 <file path=ppt/slides/slide48.xml><?xml version="1.0" encoding="utf-8"?>
+<p:sld xmlns:a="http://schemas.openxmlformats.org/drawingml/2006/main" xmlns:r="http://schemas.openxmlformats.org/officeDocument/2006/relationships" xmlns:p="http://schemas.openxmlformats.org/presentationml/2006/main">
+  <p:cSld>
+    <p:spTree>
+      <p:nvGrpSpPr>
+        <p:cNvPr id="1" name=""/>
+        <p:cNvGrpSpPr/>
+        <p:nvPr/>
+      </p:nvGrpSpPr>
+      <p:grpSpPr>
+        <a:xfrm>
+          <a:off x="0" y="0"/>
+          <a:ext cx="0" cy="0"/>
+          <a:chOff x="0" y="0"/>
+          <a:chExt cx="0" cy="0"/>
+        </a:xfrm>
+      </p:grpSpPr>
+      <p:sp>
+        <p:nvSpPr>
+          <p:cNvPr id="2" name="Başlık 1">
+            <a:extLst>
+              <a:ext uri="{FF2B5EF4-FFF2-40B4-BE49-F238E27FC236}">
+                <a16:creationId xmlns:a16="http://schemas.microsoft.com/office/drawing/2014/main" id="{A36F7380-0078-4A28-A781-E99720F1ABA6}"/>
+              </a:ext>
+            </a:extLst>
+          </p:cNvPr>
+          <p:cNvSpPr>
+            <a:spLocks noGrp="1"/>
+          </p:cNvSpPr>
+          <p:nvPr>
+            <p:ph type="title"/>
+          </p:nvPr>
+        </p:nvSpPr>
+        <p:spPr>
+          <a:xfrm>
+            <a:off x="838200" y="0"/>
+            <a:ext cx="10515600" cy="779929"/>
+          </a:xfrm>
+        </p:spPr>
+        <p:txBody>
+          <a:bodyPr/>
+          <a:lstStyle/>
+          <a:p>
+            <a:pPr algn="ctr"/>
+            <a:r>
+              <a:rPr lang="tr-TR" dirty="0"/>
+              <a:t>Git </a:t>
+            </a:r>
+            <a:r>
+              <a:rPr lang="tr-TR" dirty="0" err="1"/>
+              <a:t>Stash</a:t>
+            </a:r>
+            <a:r>
+              <a:rPr lang="tr-TR" dirty="0"/>
+              <a:t> </a:t>
+            </a:r>
+            <a:r>
+              <a:rPr lang="tr-TR" dirty="0" err="1"/>
+              <a:t>Uyguluma</a:t>
+            </a:r>
+            <a:endParaRPr lang="tr-TR" dirty="0"/>
+          </a:p>
+        </p:txBody>
+      </p:sp>
+      <p:pic>
+        <p:nvPicPr>
+          <p:cNvPr id="4" name="Resim 3">
+            <a:extLst>
+              <a:ext uri="{FF2B5EF4-FFF2-40B4-BE49-F238E27FC236}">
+                <a16:creationId xmlns:a16="http://schemas.microsoft.com/office/drawing/2014/main" id="{2C52B68B-3940-4A68-88D9-970EFF1643C3}"/>
+              </a:ext>
+            </a:extLst>
+          </p:cNvPr>
+          <p:cNvPicPr>
+            <a:picLocks noChangeAspect="1"/>
+          </p:cNvPicPr>
+          <p:nvPr/>
+        </p:nvPicPr>
+        <p:blipFill>
+          <a:blip r:embed="rId2">
+            <a:extLst>
+              <a:ext uri="{28A0092B-C50C-407E-A947-70E740481C1C}">
+                <a14:useLocalDpi xmlns:a14="http://schemas.microsoft.com/office/drawing/2010/main" val="0"/>
+              </a:ext>
+            </a:extLst>
+          </a:blip>
+          <a:stretch>
+            <a:fillRect/>
+          </a:stretch>
+        </p:blipFill>
+        <p:spPr>
+          <a:xfrm>
+            <a:off x="3887330" y="779928"/>
+            <a:ext cx="4417340" cy="6078071"/>
+          </a:xfrm>
+          <a:prstGeom prst="rect">
+            <a:avLst/>
+          </a:prstGeom>
+        </p:spPr>
+      </p:pic>
+    </p:spTree>
+    <p:extLst>
+      <p:ext uri="{BB962C8B-B14F-4D97-AF65-F5344CB8AC3E}">
+        <p14:creationId xmlns:p14="http://schemas.microsoft.com/office/powerpoint/2010/main" val="3533179054"/>
+      </p:ext>
+    </p:extLst>
+  </p:cSld>
+  <p:clrMapOvr>
+    <a:masterClrMapping/>
+  </p:clrMapOvr>
+</p:sld>
+</file>
+
+<file path=ppt/slides/slide49.xml><?xml version="1.0" encoding="utf-8"?>
 <p:sld xmlns:a="http://schemas.openxmlformats.org/drawingml/2006/main" xmlns:r="http://schemas.openxmlformats.org/officeDocument/2006/relationships" xmlns:p="http://schemas.openxmlformats.org/presentationml/2006/main">
   <p:cSld>
     <p:spTree>

</xml_diff>

<commit_message>
Rebesa ile Merge Farkı Sunuya Eklendi
</commit_message>
<xml_diff>
--- a/DevOps Proje Sunusu.pptx
+++ b/DevOps Proje Sunusu.pptx
@@ -54,6 +54,7 @@
     <p:sldId id="302" r:id="rId48"/>
     <p:sldId id="304" r:id="rId49"/>
     <p:sldId id="303" r:id="rId50"/>
+    <p:sldId id="305" r:id="rId51"/>
   </p:sldIdLst>
   <p:sldSz cx="12192000" cy="6858000"/>
   <p:notesSz cx="6858000" cy="9144000"/>
@@ -7440,6 +7441,216 @@
     <p:extLst>
       <p:ext uri="{BB962C8B-B14F-4D97-AF65-F5344CB8AC3E}">
         <p14:creationId xmlns:p14="http://schemas.microsoft.com/office/powerpoint/2010/main" val="720433152"/>
+      </p:ext>
+    </p:extLst>
+  </p:cSld>
+  <p:clrMapOvr>
+    <a:masterClrMapping/>
+  </p:clrMapOvr>
+</p:sld>
+</file>
+
+<file path=ppt/slides/slide50.xml><?xml version="1.0" encoding="utf-8"?>
+<p:sld xmlns:a="http://schemas.openxmlformats.org/drawingml/2006/main" xmlns:r="http://schemas.openxmlformats.org/officeDocument/2006/relationships" xmlns:p="http://schemas.openxmlformats.org/presentationml/2006/main">
+  <p:cSld>
+    <p:spTree>
+      <p:nvGrpSpPr>
+        <p:cNvPr id="1" name=""/>
+        <p:cNvGrpSpPr/>
+        <p:nvPr/>
+      </p:nvGrpSpPr>
+      <p:grpSpPr>
+        <a:xfrm>
+          <a:off x="0" y="0"/>
+          <a:ext cx="0" cy="0"/>
+          <a:chOff x="0" y="0"/>
+          <a:chExt cx="0" cy="0"/>
+        </a:xfrm>
+      </p:grpSpPr>
+      <p:sp>
+        <p:nvSpPr>
+          <p:cNvPr id="3" name="Başlık 2">
+            <a:extLst>
+              <a:ext uri="{FF2B5EF4-FFF2-40B4-BE49-F238E27FC236}">
+                <a16:creationId xmlns:a16="http://schemas.microsoft.com/office/drawing/2014/main" id="{90465160-B5F3-4281-97B3-DD147D4BE45B}"/>
+              </a:ext>
+            </a:extLst>
+          </p:cNvPr>
+          <p:cNvSpPr>
+            <a:spLocks noGrp="1"/>
+          </p:cNvSpPr>
+          <p:nvPr>
+            <p:ph type="title"/>
+          </p:nvPr>
+        </p:nvSpPr>
+        <p:spPr/>
+        <p:txBody>
+          <a:bodyPr/>
+          <a:lstStyle/>
+          <a:p>
+            <a:pPr algn="ctr"/>
+            <a:r>
+              <a:rPr lang="tr-TR" dirty="0" err="1"/>
+              <a:t>Rebesa</a:t>
+            </a:r>
+            <a:r>
+              <a:rPr lang="tr-TR" dirty="0"/>
+              <a:t> ile </a:t>
+            </a:r>
+            <a:r>
+              <a:rPr lang="tr-TR" dirty="0" err="1"/>
+              <a:t>Merge</a:t>
+            </a:r>
+            <a:r>
+              <a:rPr lang="tr-TR" dirty="0"/>
+              <a:t> Arasındaki Fark Nedir ?</a:t>
+            </a:r>
+          </a:p>
+        </p:txBody>
+      </p:sp>
+      <p:sp>
+        <p:nvSpPr>
+          <p:cNvPr id="4" name="İçerik Yer Tutucusu 3">
+            <a:extLst>
+              <a:ext uri="{FF2B5EF4-FFF2-40B4-BE49-F238E27FC236}">
+                <a16:creationId xmlns:a16="http://schemas.microsoft.com/office/drawing/2014/main" id="{E7678D7A-EFA7-4549-BDCB-F86ED47C1BE8}"/>
+              </a:ext>
+            </a:extLst>
+          </p:cNvPr>
+          <p:cNvSpPr>
+            <a:spLocks noGrp="1"/>
+          </p:cNvSpPr>
+          <p:nvPr>
+            <p:ph idx="1"/>
+          </p:nvPr>
+        </p:nvSpPr>
+        <p:spPr/>
+        <p:txBody>
+          <a:bodyPr>
+            <a:normAutofit fontScale="77500" lnSpcReduction="20000"/>
+          </a:bodyPr>
+          <a:lstStyle/>
+          <a:p>
+            <a:r>
+              <a:rPr lang="tr-TR" dirty="0"/>
+              <a:t>"</a:t>
+            </a:r>
+            <a:r>
+              <a:rPr lang="tr-TR" dirty="0" err="1"/>
+              <a:t>Rebase</a:t>
+            </a:r>
+            <a:r>
+              <a:rPr lang="tr-TR" dirty="0"/>
+              <a:t>" ve "</a:t>
+            </a:r>
+            <a:r>
+              <a:rPr lang="tr-TR" dirty="0" err="1"/>
+              <a:t>merge</a:t>
+            </a:r>
+            <a:r>
+              <a:rPr lang="tr-TR" dirty="0"/>
+              <a:t>" işlemleri, bir daldaki değişiklikleri başka bir dal ile birleştirmek için kullanılan Git yöntemleridir.</a:t>
+            </a:r>
+          </a:p>
+          <a:p>
+            <a:r>
+              <a:rPr lang="tr-TR" dirty="0" err="1"/>
+              <a:t>Merge</a:t>
+            </a:r>
+            <a:r>
+              <a:rPr lang="tr-TR" dirty="0"/>
+              <a:t> (Birleştirme): </a:t>
+            </a:r>
+            <a:r>
+              <a:rPr lang="tr-TR" dirty="0" err="1"/>
+              <a:t>Merge</a:t>
+            </a:r>
+            <a:r>
+              <a:rPr lang="tr-TR" dirty="0"/>
+              <a:t> işlemi, iki farklı dalda yapılan değişiklikleri birleştirir ve sonuç olarak yeni bir </a:t>
+            </a:r>
+            <a:r>
+              <a:rPr lang="tr-TR" dirty="0" err="1"/>
+              <a:t>commit</a:t>
+            </a:r>
+            <a:r>
+              <a:rPr lang="tr-TR" dirty="0"/>
+              <a:t> oluşturur. Bu işlem, genellikle lineer olmayan tarihçelerde kullanılır. </a:t>
+            </a:r>
+            <a:r>
+              <a:rPr lang="tr-TR" dirty="0" err="1"/>
+              <a:t>Merge</a:t>
+            </a:r>
+            <a:r>
+              <a:rPr lang="tr-TR" dirty="0"/>
+              <a:t> işlemi, mevcut dalınıza diğer bir dalı birleştirmek istediğinizde kullanışlıdır. Birleştirme sonucunda, her iki daldaki değişikliklerin geçmişi korunur.</a:t>
+            </a:r>
+          </a:p>
+          <a:p>
+            <a:endParaRPr lang="tr-TR" dirty="0"/>
+          </a:p>
+          <a:p>
+            <a:r>
+              <a:rPr lang="tr-TR" dirty="0" err="1"/>
+              <a:t>Rebase</a:t>
+            </a:r>
+            <a:r>
+              <a:rPr lang="tr-TR" dirty="0"/>
+              <a:t> (Yeniden Temel Alma): </a:t>
+            </a:r>
+            <a:r>
+              <a:rPr lang="tr-TR" dirty="0" err="1"/>
+              <a:t>Rebase</a:t>
+            </a:r>
+            <a:r>
+              <a:rPr lang="tr-TR" dirty="0"/>
+              <a:t> işlemi, mevcut dalınızı hedef dala "tekrar temel alır" ve mevcut dalınızdaki değişiklikleri hedef dalın üzerine uygular. Sonuç olarak, tarihçe daha temiz ve düzenli olur çünkü değişiklikler düzgün bir şekilde sıralanır. </a:t>
+            </a:r>
+            <a:r>
+              <a:rPr lang="tr-TR" dirty="0" err="1"/>
+              <a:t>Rebase</a:t>
+            </a:r>
+            <a:r>
+              <a:rPr lang="tr-TR" dirty="0"/>
+              <a:t> işlemi, genellikle lineer tarihçe tutmaya ihtiyaç duyduğunuzda veya daha temiz bir tarihçe elde etmek istediğinizde tercih edilir.</a:t>
+            </a:r>
+          </a:p>
+          <a:p>
+            <a:endParaRPr lang="tr-TR" dirty="0"/>
+          </a:p>
+          <a:p>
+            <a:r>
+              <a:rPr lang="tr-TR" dirty="0"/>
+              <a:t>Özetle, </a:t>
+            </a:r>
+            <a:r>
+              <a:rPr lang="tr-TR" dirty="0" err="1"/>
+              <a:t>merge</a:t>
+            </a:r>
+            <a:r>
+              <a:rPr lang="tr-TR" dirty="0"/>
+              <a:t> işlemi değişiklikleri birleştirirken, </a:t>
+            </a:r>
+            <a:r>
+              <a:rPr lang="tr-TR" dirty="0" err="1"/>
+              <a:t>rebase</a:t>
+            </a:r>
+            <a:r>
+              <a:rPr lang="tr-TR" dirty="0"/>
+              <a:t> işlemi mevcut dalınızı hedef dala tekrar temel alır ve değişiklikleri </a:t>
+            </a:r>
+            <a:r>
+              <a:rPr lang="tr-TR"/>
+              <a:t>uygular.</a:t>
+            </a:r>
+            <a:endParaRPr lang="tr-TR" dirty="0"/>
+          </a:p>
+        </p:txBody>
+      </p:sp>
+    </p:spTree>
+    <p:extLst>
+      <p:ext uri="{BB962C8B-B14F-4D97-AF65-F5344CB8AC3E}">
+        <p14:creationId xmlns:p14="http://schemas.microsoft.com/office/powerpoint/2010/main" val="2984488151"/>
       </p:ext>
     </p:extLst>
   </p:cSld>

</xml_diff>

<commit_message>
Conflict ve Conflict Sonrası Yapılacaklar Sunuya Eklendi
</commit_message>
<xml_diff>
--- a/DevOps Proje Sunusu.pptx
+++ b/DevOps Proje Sunusu.pptx
@@ -55,6 +55,8 @@
     <p:sldId id="304" r:id="rId49"/>
     <p:sldId id="303" r:id="rId50"/>
     <p:sldId id="305" r:id="rId51"/>
+    <p:sldId id="306" r:id="rId52"/>
+    <p:sldId id="307" r:id="rId53"/>
   </p:sldIdLst>
   <p:sldSz cx="12192000" cy="6858000"/>
   <p:notesSz cx="6858000" cy="9144000"/>
@@ -7651,6 +7653,342 @@
     <p:extLst>
       <p:ext uri="{BB962C8B-B14F-4D97-AF65-F5344CB8AC3E}">
         <p14:creationId xmlns:p14="http://schemas.microsoft.com/office/powerpoint/2010/main" val="2984488151"/>
+      </p:ext>
+    </p:extLst>
+  </p:cSld>
+  <p:clrMapOvr>
+    <a:masterClrMapping/>
+  </p:clrMapOvr>
+</p:sld>
+</file>
+
+<file path=ppt/slides/slide51.xml><?xml version="1.0" encoding="utf-8"?>
+<p:sld xmlns:a="http://schemas.openxmlformats.org/drawingml/2006/main" xmlns:r="http://schemas.openxmlformats.org/officeDocument/2006/relationships" xmlns:p="http://schemas.openxmlformats.org/presentationml/2006/main">
+  <p:cSld>
+    <p:spTree>
+      <p:nvGrpSpPr>
+        <p:cNvPr id="1" name=""/>
+        <p:cNvGrpSpPr/>
+        <p:nvPr/>
+      </p:nvGrpSpPr>
+      <p:grpSpPr>
+        <a:xfrm>
+          <a:off x="0" y="0"/>
+          <a:ext cx="0" cy="0"/>
+          <a:chOff x="0" y="0"/>
+          <a:chExt cx="0" cy="0"/>
+        </a:xfrm>
+      </p:grpSpPr>
+      <p:sp>
+        <p:nvSpPr>
+          <p:cNvPr id="2" name="Başlık 1">
+            <a:extLst>
+              <a:ext uri="{FF2B5EF4-FFF2-40B4-BE49-F238E27FC236}">
+                <a16:creationId xmlns:a16="http://schemas.microsoft.com/office/drawing/2014/main" id="{995B406B-7E16-4D6A-91C1-4BAD5C3233E6}"/>
+              </a:ext>
+            </a:extLst>
+          </p:cNvPr>
+          <p:cNvSpPr>
+            <a:spLocks noGrp="1"/>
+          </p:cNvSpPr>
+          <p:nvPr>
+            <p:ph type="title"/>
+          </p:nvPr>
+        </p:nvSpPr>
+        <p:spPr/>
+        <p:txBody>
+          <a:bodyPr/>
+          <a:lstStyle/>
+          <a:p>
+            <a:pPr algn="ctr"/>
+            <a:r>
+              <a:rPr lang="tr-TR" dirty="0"/>
+              <a:t>Git </a:t>
+            </a:r>
+            <a:r>
+              <a:rPr lang="tr-TR" dirty="0" err="1"/>
+              <a:t>Conflict</a:t>
+            </a:r>
+            <a:r>
+              <a:rPr lang="tr-TR" dirty="0"/>
+              <a:t> Nedir ? </a:t>
+            </a:r>
+          </a:p>
+        </p:txBody>
+      </p:sp>
+      <p:sp>
+        <p:nvSpPr>
+          <p:cNvPr id="3" name="İçerik Yer Tutucusu 2">
+            <a:extLst>
+              <a:ext uri="{FF2B5EF4-FFF2-40B4-BE49-F238E27FC236}">
+                <a16:creationId xmlns:a16="http://schemas.microsoft.com/office/drawing/2014/main" id="{B857C0E8-9FD6-4B8C-BD0E-A7097C9A3282}"/>
+              </a:ext>
+            </a:extLst>
+          </p:cNvPr>
+          <p:cNvSpPr>
+            <a:spLocks noGrp="1"/>
+          </p:cNvSpPr>
+          <p:nvPr>
+            <p:ph idx="1"/>
+          </p:nvPr>
+        </p:nvSpPr>
+        <p:spPr/>
+        <p:txBody>
+          <a:bodyPr>
+            <a:normAutofit/>
+          </a:bodyPr>
+          <a:lstStyle/>
+          <a:p>
+            <a:r>
+              <a:rPr lang="tr-TR" dirty="0"/>
+              <a:t>Git </a:t>
+            </a:r>
+            <a:r>
+              <a:rPr lang="tr-TR" dirty="0" err="1"/>
+              <a:t>Conflict</a:t>
+            </a:r>
+            <a:r>
+              <a:rPr lang="tr-TR" dirty="0"/>
+              <a:t> (Çakışma): Git </a:t>
+            </a:r>
+            <a:r>
+              <a:rPr lang="tr-TR" dirty="0" err="1"/>
+              <a:t>conflict</a:t>
+            </a:r>
+            <a:r>
+              <a:rPr lang="tr-TR" dirty="0"/>
+              <a:t> veya çakışma, iki farklı kaynaktan gelen değişikliklerin uyumlu olmadığı durumlardır. Örneğin, aynı dosyanın aynı satırında farklı değişiklikler yapıldığında veya farklı daldan gelen değişiklikler çakıştığında bir </a:t>
+            </a:r>
+            <a:r>
+              <a:rPr lang="tr-TR" dirty="0" err="1"/>
+              <a:t>conflict</a:t>
+            </a:r>
+            <a:r>
+              <a:rPr lang="tr-TR" dirty="0"/>
+              <a:t> meydana gelir. Git, bu durumda otomatik birleştirme yapamaz ve kullanıcıdan bir karar almasını ister.</a:t>
+            </a:r>
+          </a:p>
+        </p:txBody>
+      </p:sp>
+    </p:spTree>
+    <p:extLst>
+      <p:ext uri="{BB962C8B-B14F-4D97-AF65-F5344CB8AC3E}">
+        <p14:creationId xmlns:p14="http://schemas.microsoft.com/office/powerpoint/2010/main" val="4185889807"/>
+      </p:ext>
+    </p:extLst>
+  </p:cSld>
+  <p:clrMapOvr>
+    <a:masterClrMapping/>
+  </p:clrMapOvr>
+</p:sld>
+</file>
+
+<file path=ppt/slides/slide52.xml><?xml version="1.0" encoding="utf-8"?>
+<p:sld xmlns:a="http://schemas.openxmlformats.org/drawingml/2006/main" xmlns:r="http://schemas.openxmlformats.org/officeDocument/2006/relationships" xmlns:p="http://schemas.openxmlformats.org/presentationml/2006/main">
+  <p:cSld>
+    <p:spTree>
+      <p:nvGrpSpPr>
+        <p:cNvPr id="1" name=""/>
+        <p:cNvGrpSpPr/>
+        <p:nvPr/>
+      </p:nvGrpSpPr>
+      <p:grpSpPr>
+        <a:xfrm>
+          <a:off x="0" y="0"/>
+          <a:ext cx="0" cy="0"/>
+          <a:chOff x="0" y="0"/>
+          <a:chExt cx="0" cy="0"/>
+        </a:xfrm>
+      </p:grpSpPr>
+      <p:sp>
+        <p:nvSpPr>
+          <p:cNvPr id="2" name="Başlık 1">
+            <a:extLst>
+              <a:ext uri="{FF2B5EF4-FFF2-40B4-BE49-F238E27FC236}">
+                <a16:creationId xmlns:a16="http://schemas.microsoft.com/office/drawing/2014/main" id="{82B36D95-672F-4EB1-AF14-63B0ADDFDEDC}"/>
+              </a:ext>
+            </a:extLst>
+          </p:cNvPr>
+          <p:cNvSpPr>
+            <a:spLocks noGrp="1"/>
+          </p:cNvSpPr>
+          <p:nvPr>
+            <p:ph type="title"/>
+          </p:nvPr>
+        </p:nvSpPr>
+        <p:spPr/>
+        <p:txBody>
+          <a:bodyPr/>
+          <a:lstStyle/>
+          <a:p>
+            <a:pPr algn="ctr"/>
+            <a:r>
+              <a:rPr lang="tr-TR" dirty="0"/>
+              <a:t>Bir </a:t>
+            </a:r>
+            <a:r>
+              <a:rPr lang="tr-TR" dirty="0" err="1"/>
+              <a:t>Conflict</a:t>
+            </a:r>
+            <a:r>
+              <a:rPr lang="tr-TR" dirty="0"/>
+              <a:t> Yediğimizde Ne Yapmamız Gerekiyor ?</a:t>
+            </a:r>
+          </a:p>
+        </p:txBody>
+      </p:sp>
+      <p:sp>
+        <p:nvSpPr>
+          <p:cNvPr id="3" name="İçerik Yer Tutucusu 2">
+            <a:extLst>
+              <a:ext uri="{FF2B5EF4-FFF2-40B4-BE49-F238E27FC236}">
+                <a16:creationId xmlns:a16="http://schemas.microsoft.com/office/drawing/2014/main" id="{1FF4C61B-1596-4B4D-904A-46C4E6037458}"/>
+              </a:ext>
+            </a:extLst>
+          </p:cNvPr>
+          <p:cNvSpPr>
+            <a:spLocks noGrp="1"/>
+          </p:cNvSpPr>
+          <p:nvPr>
+            <p:ph idx="1"/>
+          </p:nvPr>
+        </p:nvSpPr>
+        <p:spPr/>
+        <p:txBody>
+          <a:bodyPr>
+            <a:normAutofit/>
+          </a:bodyPr>
+          <a:lstStyle/>
+          <a:p>
+            <a:pPr marL="514350" indent="-514350">
+              <a:buFont typeface="+mj-lt"/>
+              <a:buAutoNum type="arabicPeriod"/>
+            </a:pPr>
+            <a:r>
+              <a:rPr lang="tr-TR" dirty="0"/>
+              <a:t>İlk adım, </a:t>
+            </a:r>
+            <a:r>
+              <a:rPr lang="tr-TR" dirty="0" err="1"/>
+              <a:t>conflict'i</a:t>
+            </a:r>
+            <a:r>
+              <a:rPr lang="tr-TR" dirty="0"/>
+              <a:t> tespit etmektir. Git size </a:t>
+            </a:r>
+            <a:r>
+              <a:rPr lang="tr-TR" dirty="0" err="1"/>
+              <a:t>conflict</a:t>
+            </a:r>
+            <a:r>
+              <a:rPr lang="tr-TR" dirty="0"/>
+              <a:t> olduğunu belirten bir uyarı verecektir.</a:t>
+            </a:r>
+          </a:p>
+          <a:p>
+            <a:pPr marL="514350" indent="-514350">
+              <a:buFont typeface="+mj-lt"/>
+              <a:buAutoNum type="arabicPeriod"/>
+            </a:pPr>
+            <a:r>
+              <a:rPr lang="tr-TR" dirty="0" err="1"/>
+              <a:t>Conflict</a:t>
+            </a:r>
+            <a:r>
+              <a:rPr lang="tr-TR" dirty="0"/>
+              <a:t> durumunda, öncelikle çakışan dosyaları elle düzeltmeniz gerekecektir. Bu, çakışan dosyaları açarak, </a:t>
+            </a:r>
+            <a:r>
+              <a:rPr lang="tr-TR" dirty="0" err="1"/>
+              <a:t>conflict'in</a:t>
+            </a:r>
+            <a:r>
+              <a:rPr lang="tr-TR" dirty="0"/>
+              <a:t> olduğu satırları düzenlemeniz veya çözmeniz anlamına gelir.</a:t>
+            </a:r>
+          </a:p>
+          <a:p>
+            <a:pPr marL="514350" indent="-514350">
+              <a:buFont typeface="+mj-lt"/>
+              <a:buAutoNum type="arabicPeriod"/>
+            </a:pPr>
+            <a:r>
+              <a:rPr lang="tr-TR" dirty="0"/>
+              <a:t>Daha sonra, </a:t>
+            </a:r>
+            <a:r>
+              <a:rPr lang="tr-TR" dirty="0" err="1"/>
+              <a:t>conflict'i</a:t>
+            </a:r>
+            <a:r>
+              <a:rPr lang="tr-TR" dirty="0"/>
+              <a:t> çözdüğünüz dosyaları işaretleyip, "git </a:t>
+            </a:r>
+            <a:r>
+              <a:rPr lang="tr-TR" dirty="0" err="1"/>
+              <a:t>add</a:t>
+            </a:r>
+            <a:r>
+              <a:rPr lang="tr-TR" dirty="0"/>
+              <a:t>" komutunu kullanarak </a:t>
+            </a:r>
+            <a:r>
+              <a:rPr lang="tr-TR" dirty="0" err="1"/>
+              <a:t>staged</a:t>
+            </a:r>
+            <a:r>
+              <a:rPr lang="tr-TR" dirty="0"/>
+              <a:t> </a:t>
+            </a:r>
+            <a:r>
+              <a:rPr lang="tr-TR" dirty="0" err="1"/>
+              <a:t>area'ya</a:t>
+            </a:r>
+            <a:r>
+              <a:rPr lang="tr-TR" dirty="0"/>
+              <a:t> eklemeniz gerekir.</a:t>
+            </a:r>
+          </a:p>
+          <a:p>
+            <a:pPr marL="514350" indent="-514350">
+              <a:buFont typeface="+mj-lt"/>
+              <a:buAutoNum type="arabicPeriod"/>
+            </a:pPr>
+            <a:r>
+              <a:rPr lang="tr-TR" dirty="0"/>
+              <a:t>Son adımda, "git </a:t>
+            </a:r>
+            <a:r>
+              <a:rPr lang="tr-TR" dirty="0" err="1"/>
+              <a:t>commit</a:t>
+            </a:r>
+            <a:r>
+              <a:rPr lang="tr-TR" dirty="0"/>
+              <a:t>" komutunu kullanarak </a:t>
+            </a:r>
+            <a:r>
+              <a:rPr lang="tr-TR" dirty="0" err="1"/>
+              <a:t>conflict'i</a:t>
+            </a:r>
+            <a:r>
+              <a:rPr lang="tr-TR" dirty="0"/>
+              <a:t> çözmüş ve düzeltmiş olduğunuz dosyaları </a:t>
+            </a:r>
+            <a:r>
+              <a:rPr lang="tr-TR" dirty="0" err="1"/>
+              <a:t>commit</a:t>
+            </a:r>
+            <a:r>
+              <a:rPr lang="tr-TR" dirty="0"/>
+              <a:t> etmelisiniz.</a:t>
+            </a:r>
+          </a:p>
+        </p:txBody>
+      </p:sp>
+    </p:spTree>
+    <p:extLst>
+      <p:ext uri="{BB962C8B-B14F-4D97-AF65-F5344CB8AC3E}">
+        <p14:creationId xmlns:p14="http://schemas.microsoft.com/office/powerpoint/2010/main" val="3939430025"/>
       </p:ext>
     </p:extLst>
   </p:cSld>

</xml_diff>